<commit_message>
force commit synced README files
</commit_message>
<xml_diff>
--- a/20251027polyreg（田中）.pptx
+++ b/20251027polyreg（田中）.pptx
@@ -5,10 +5,10 @@
     <p:sldMasterId id="2147483684" r:id="rId1"/>
   </p:sldMasterIdLst>
   <p:notesMasterIdLst>
-    <p:notesMasterId r:id="rId11"/>
+    <p:notesMasterId r:id="rId15"/>
   </p:notesMasterIdLst>
   <p:handoutMasterIdLst>
-    <p:handoutMasterId r:id="rId12"/>
+    <p:handoutMasterId r:id="rId16"/>
   </p:handoutMasterIdLst>
   <p:sldIdLst>
     <p:sldId id="1553" r:id="rId2"/>
@@ -19,7 +19,11 @@
     <p:sldId id="1554" r:id="rId7"/>
     <p:sldId id="1562" r:id="rId8"/>
     <p:sldId id="1561" r:id="rId9"/>
-    <p:sldId id="1560" r:id="rId10"/>
+    <p:sldId id="1563" r:id="rId10"/>
+    <p:sldId id="1560" r:id="rId11"/>
+    <p:sldId id="1564" r:id="rId12"/>
+    <p:sldId id="1566" r:id="rId13"/>
+    <p:sldId id="1565" r:id="rId14"/>
   </p:sldIdLst>
   <p:sldSz cx="12192000" cy="6858000"/>
   <p:notesSz cx="7099300" cy="10234613"/>
@@ -4010,6 +4014,734 @@
 </p:sld>
 </file>
 
+<file path=ppt/slides/slide10.xml><?xml version="1.0" encoding="utf-8"?>
+<p:sld xmlns:a="http://schemas.openxmlformats.org/drawingml/2006/main" xmlns:r="http://schemas.openxmlformats.org/officeDocument/2006/relationships" xmlns:p="http://schemas.openxmlformats.org/presentationml/2006/main">
+  <p:cSld>
+    <p:spTree>
+      <p:nvGrpSpPr>
+        <p:cNvPr id="1" name=""/>
+        <p:cNvGrpSpPr/>
+        <p:nvPr/>
+      </p:nvGrpSpPr>
+      <p:grpSpPr>
+        <a:xfrm>
+          <a:off x="0" y="0"/>
+          <a:ext cx="0" cy="0"/>
+          <a:chOff x="0" y="0"/>
+          <a:chExt cx="0" cy="0"/>
+        </a:xfrm>
+      </p:grpSpPr>
+      <p:sp>
+        <p:nvSpPr>
+          <p:cNvPr id="2" name="タイトル 1">
+            <a:extLst>
+              <a:ext uri="{FF2B5EF4-FFF2-40B4-BE49-F238E27FC236}">
+                <a16:creationId xmlns:a16="http://schemas.microsoft.com/office/drawing/2014/main" id="{46525439-09F3-4E2E-B4E2-1B63ED4E7C74}"/>
+              </a:ext>
+            </a:extLst>
+          </p:cNvPr>
+          <p:cNvSpPr>
+            <a:spLocks noGrp="1"/>
+          </p:cNvSpPr>
+          <p:nvPr>
+            <p:ph type="title"/>
+          </p:nvPr>
+        </p:nvSpPr>
+        <p:spPr/>
+        <p:txBody>
+          <a:bodyPr/>
+          <a:lstStyle/>
+          <a:p>
+            <a:r>
+              <a:rPr lang="en-US" altLang="ja-JP" dirty="0" err="1"/>
+              <a:t>cifplot</a:t>
+            </a:r>
+            <a:r>
+              <a:rPr lang="en-US" altLang="ja-JP" dirty="0"/>
+              <a:t>()</a:t>
+            </a:r>
+            <a:r>
+              <a:rPr lang="ja-JP" altLang="en-US" dirty="0"/>
+              <a:t>のロジックを構成する関数</a:t>
+            </a:r>
+            <a:endParaRPr kumimoji="1" lang="ja-JP" altLang="en-US" dirty="0"/>
+          </a:p>
+        </p:txBody>
+      </p:sp>
+      <p:sp>
+        <p:nvSpPr>
+          <p:cNvPr id="3" name="コンテンツ プレースホルダー 2">
+            <a:extLst>
+              <a:ext uri="{FF2B5EF4-FFF2-40B4-BE49-F238E27FC236}">
+                <a16:creationId xmlns:a16="http://schemas.microsoft.com/office/drawing/2014/main" id="{5B73CB70-23AE-4375-AFE6-21B34DD533DA}"/>
+              </a:ext>
+            </a:extLst>
+          </p:cNvPr>
+          <p:cNvSpPr>
+            <a:spLocks noGrp="1"/>
+          </p:cNvSpPr>
+          <p:nvPr>
+            <p:ph idx="1"/>
+          </p:nvPr>
+        </p:nvSpPr>
+        <p:spPr/>
+        <p:txBody>
+          <a:bodyPr/>
+          <a:lstStyle/>
+          <a:p>
+            <a:r>
+              <a:rPr lang="en-US" altLang="ja-JP" dirty="0" err="1"/>
+              <a:t>cifplot_single</a:t>
+            </a:r>
+            <a:r>
+              <a:rPr lang="en-US" altLang="ja-JP" dirty="0"/>
+              <a:t>()</a:t>
+            </a:r>
+          </a:p>
+          <a:p>
+            <a:pPr lvl="1"/>
+            <a:r>
+              <a:rPr lang="ja-JP" altLang="en-US" dirty="0"/>
+              <a:t>引数を整理し</a:t>
+            </a:r>
+            <a:r>
+              <a:rPr lang="en-US" altLang="ja-JP" dirty="0"/>
+              <a:t>, </a:t>
+            </a:r>
+            <a:r>
+              <a:rPr lang="en-US" altLang="ja-JP" dirty="0" err="1"/>
+              <a:t>call_ggsurvfit</a:t>
+            </a:r>
+            <a:r>
+              <a:rPr lang="en-US" altLang="ja-JP" dirty="0"/>
+              <a:t>()</a:t>
+            </a:r>
+            <a:r>
+              <a:rPr lang="ja-JP" altLang="en-US" dirty="0"/>
+              <a:t>に渡す</a:t>
+            </a:r>
+            <a:endParaRPr lang="en-US" altLang="ja-JP" dirty="0"/>
+          </a:p>
+          <a:p>
+            <a:r>
+              <a:rPr lang="en-US" altLang="ja-JP" dirty="0" err="1"/>
+              <a:t>call_ggsurvfit</a:t>
+            </a:r>
+            <a:r>
+              <a:rPr lang="en-US" altLang="ja-JP" dirty="0"/>
+              <a:t>()</a:t>
+            </a:r>
+          </a:p>
+          <a:p>
+            <a:pPr lvl="1"/>
+            <a:r>
+              <a:rPr lang="ja-JP" altLang="en-US" dirty="0"/>
+              <a:t>プロットの指定に従って</a:t>
+            </a:r>
+            <a:r>
+              <a:rPr lang="en-US" altLang="ja-JP" dirty="0" err="1"/>
+              <a:t>ggsurvfit</a:t>
+            </a:r>
+            <a:r>
+              <a:rPr lang="en-US" altLang="ja-JP" dirty="0"/>
+              <a:t>()</a:t>
+            </a:r>
+            <a:r>
+              <a:rPr lang="ja-JP" altLang="en-US" dirty="0"/>
+              <a:t>を実行</a:t>
+            </a:r>
+            <a:endParaRPr lang="en-US" altLang="ja-JP" dirty="0"/>
+          </a:p>
+          <a:p>
+            <a:r>
+              <a:rPr lang="en-US" altLang="ja-JP" dirty="0" err="1"/>
+              <a:t>check_ggsurvfit</a:t>
+            </a:r>
+            <a:r>
+              <a:rPr lang="en-US" altLang="ja-JP" dirty="0"/>
+              <a:t>()</a:t>
+            </a:r>
+          </a:p>
+          <a:p>
+            <a:pPr lvl="1"/>
+            <a:r>
+              <a:rPr lang="en-US" altLang="ja-JP" dirty="0" err="1"/>
+              <a:t>call_ggsurvfit</a:t>
+            </a:r>
+            <a:r>
+              <a:rPr lang="en-US" altLang="ja-JP" dirty="0"/>
+              <a:t>()</a:t>
+            </a:r>
+            <a:r>
+              <a:rPr lang="ja-JP" altLang="en-US" dirty="0"/>
+              <a:t>の重い前処理</a:t>
+            </a:r>
+            <a:endParaRPr lang="en-US" altLang="ja-JP" dirty="0"/>
+          </a:p>
+          <a:p>
+            <a:r>
+              <a:rPr lang="en-US" altLang="ja-JP" dirty="0" err="1"/>
+              <a:t>cifplot_printEachVar</a:t>
+            </a:r>
+            <a:r>
+              <a:rPr lang="en-US" altLang="ja-JP" dirty="0"/>
+              <a:t>()</a:t>
+            </a:r>
+          </a:p>
+          <a:p>
+            <a:pPr lvl="1"/>
+            <a:r>
+              <a:rPr lang="ja-JP" altLang="en-US" dirty="0"/>
+              <a:t>引数を整理し</a:t>
+            </a:r>
+            <a:r>
+              <a:rPr lang="en-US" altLang="ja-JP" dirty="0"/>
+              <a:t>, </a:t>
+            </a:r>
+            <a:r>
+              <a:rPr lang="en-US" altLang="ja-JP" dirty="0" err="1"/>
+              <a:t>cifplot_single</a:t>
+            </a:r>
+            <a:r>
+              <a:rPr lang="en-US" altLang="ja-JP" dirty="0"/>
+              <a:t>()</a:t>
+            </a:r>
+            <a:r>
+              <a:rPr lang="ja-JP" altLang="en-US" dirty="0"/>
+              <a:t>を層別変数ごとに実行</a:t>
+            </a:r>
+            <a:endParaRPr lang="en-US" altLang="ja-JP" dirty="0"/>
+          </a:p>
+        </p:txBody>
+      </p:sp>
+    </p:spTree>
+    <p:extLst>
+      <p:ext uri="{BB962C8B-B14F-4D97-AF65-F5344CB8AC3E}">
+        <p14:creationId xmlns:p14="http://schemas.microsoft.com/office/powerpoint/2010/main" val="60562793"/>
+      </p:ext>
+    </p:extLst>
+  </p:cSld>
+  <p:clrMapOvr>
+    <a:masterClrMapping/>
+  </p:clrMapOvr>
+</p:sld>
+</file>
+
+<file path=ppt/slides/slide11.xml><?xml version="1.0" encoding="utf-8"?>
+<p:sld xmlns:a="http://schemas.openxmlformats.org/drawingml/2006/main" xmlns:r="http://schemas.openxmlformats.org/officeDocument/2006/relationships" xmlns:p="http://schemas.openxmlformats.org/presentationml/2006/main">
+  <p:cSld>
+    <p:spTree>
+      <p:nvGrpSpPr>
+        <p:cNvPr id="1" name=""/>
+        <p:cNvGrpSpPr/>
+        <p:nvPr/>
+      </p:nvGrpSpPr>
+      <p:grpSpPr>
+        <a:xfrm>
+          <a:off x="0" y="0"/>
+          <a:ext cx="0" cy="0"/>
+          <a:chOff x="0" y="0"/>
+          <a:chExt cx="0" cy="0"/>
+        </a:xfrm>
+      </p:grpSpPr>
+      <p:sp>
+        <p:nvSpPr>
+          <p:cNvPr id="2" name="タイトル 1">
+            <a:extLst>
+              <a:ext uri="{FF2B5EF4-FFF2-40B4-BE49-F238E27FC236}">
+                <a16:creationId xmlns:a16="http://schemas.microsoft.com/office/drawing/2014/main" id="{AE096692-8EB2-40F4-A6CF-FF9BBBE0B99B}"/>
+              </a:ext>
+            </a:extLst>
+          </p:cNvPr>
+          <p:cNvSpPr>
+            <a:spLocks noGrp="1"/>
+          </p:cNvSpPr>
+          <p:nvPr>
+            <p:ph type="title"/>
+          </p:nvPr>
+        </p:nvSpPr>
+        <p:spPr/>
+        <p:txBody>
+          <a:bodyPr/>
+          <a:lstStyle/>
+          <a:p>
+            <a:r>
+              <a:rPr kumimoji="1" lang="en-US" altLang="ja-JP" dirty="0" err="1"/>
+              <a:t>cifpanel</a:t>
+            </a:r>
+            <a:r>
+              <a:rPr kumimoji="1" lang="en-US" altLang="ja-JP" dirty="0"/>
+              <a:t>()</a:t>
+            </a:r>
+            <a:endParaRPr kumimoji="1" lang="ja-JP" altLang="en-US" dirty="0"/>
+          </a:p>
+        </p:txBody>
+      </p:sp>
+      <p:sp>
+        <p:nvSpPr>
+          <p:cNvPr id="3" name="コンテンツ プレースホルダー 2">
+            <a:extLst>
+              <a:ext uri="{FF2B5EF4-FFF2-40B4-BE49-F238E27FC236}">
+                <a16:creationId xmlns:a16="http://schemas.microsoft.com/office/drawing/2014/main" id="{6FA5D4EB-573F-4C3B-83EB-77404EB3A1CE}"/>
+              </a:ext>
+            </a:extLst>
+          </p:cNvPr>
+          <p:cNvSpPr>
+            <a:spLocks noGrp="1"/>
+          </p:cNvSpPr>
+          <p:nvPr>
+            <p:ph idx="1"/>
+          </p:nvPr>
+        </p:nvSpPr>
+        <p:spPr/>
+        <p:txBody>
+          <a:bodyPr/>
+          <a:lstStyle/>
+          <a:p>
+            <a:r>
+              <a:rPr lang="en-US" altLang="ja-JP" dirty="0" err="1"/>
+              <a:t>cifcurve</a:t>
+            </a:r>
+            <a:r>
+              <a:rPr lang="en-US" altLang="ja-JP" dirty="0"/>
+              <a:t>()</a:t>
+            </a:r>
+            <a:r>
+              <a:rPr lang="ja-JP" altLang="en-US" dirty="0"/>
+              <a:t>と</a:t>
+            </a:r>
+            <a:r>
+              <a:rPr lang="en-US" altLang="ja-JP" dirty="0"/>
+              <a:t>patchwork</a:t>
+            </a:r>
+            <a:r>
+              <a:rPr kumimoji="1" lang="en-US" altLang="ja-JP" dirty="0"/>
+              <a:t>::</a:t>
+            </a:r>
+            <a:r>
+              <a:rPr kumimoji="1" lang="en-US" altLang="ja-JP" dirty="0" err="1"/>
+              <a:t>wrap_plots</a:t>
+            </a:r>
+            <a:r>
+              <a:rPr kumimoji="1" lang="ja-JP" altLang="en-US" dirty="0"/>
+              <a:t>のラッパー関数</a:t>
+            </a:r>
+            <a:endParaRPr kumimoji="1" lang="en-US" altLang="ja-JP" dirty="0"/>
+          </a:p>
+          <a:p>
+            <a:r>
+              <a:rPr lang="ja-JP" altLang="en-US" dirty="0"/>
+              <a:t>ほとんどの処理は</a:t>
+            </a:r>
+            <a:r>
+              <a:rPr lang="en-US" altLang="ja-JP" dirty="0"/>
+              <a:t>, </a:t>
+            </a:r>
+            <a:r>
+              <a:rPr lang="ja-JP" altLang="en-US" dirty="0"/>
+              <a:t>線種・ラベル・軸などの指定をパネルに　反映させるためのもの</a:t>
+            </a:r>
+            <a:endParaRPr lang="en-US" altLang="ja-JP" dirty="0"/>
+          </a:p>
+          <a:p>
+            <a:r>
+              <a:rPr kumimoji="1" lang="ja-JP" altLang="en-US" dirty="0"/>
+              <a:t>それぞれ</a:t>
+            </a:r>
+            <a:r>
+              <a:rPr kumimoji="1" lang="en-US" altLang="ja-JP" dirty="0"/>
+              <a:t>ggplot2</a:t>
+            </a:r>
+            <a:r>
+              <a:rPr kumimoji="1" lang="ja-JP" altLang="en-US" dirty="0"/>
+              <a:t>の文法に従ったヘルパー関数を用いて処理</a:t>
+            </a:r>
+            <a:endParaRPr kumimoji="1" lang="en-US" altLang="ja-JP" dirty="0"/>
+          </a:p>
+          <a:p>
+            <a:endParaRPr kumimoji="1" lang="ja-JP" altLang="en-US" dirty="0"/>
+          </a:p>
+        </p:txBody>
+      </p:sp>
+    </p:spTree>
+    <p:extLst>
+      <p:ext uri="{BB962C8B-B14F-4D97-AF65-F5344CB8AC3E}">
+        <p14:creationId xmlns:p14="http://schemas.microsoft.com/office/powerpoint/2010/main" val="2522618317"/>
+      </p:ext>
+    </p:extLst>
+  </p:cSld>
+  <p:clrMapOvr>
+    <a:masterClrMapping/>
+  </p:clrMapOvr>
+</p:sld>
+</file>
+
+<file path=ppt/slides/slide12.xml><?xml version="1.0" encoding="utf-8"?>
+<p:sld xmlns:a="http://schemas.openxmlformats.org/drawingml/2006/main" xmlns:r="http://schemas.openxmlformats.org/officeDocument/2006/relationships" xmlns:p="http://schemas.openxmlformats.org/presentationml/2006/main">
+  <p:cSld>
+    <p:spTree>
+      <p:nvGrpSpPr>
+        <p:cNvPr id="1" name=""/>
+        <p:cNvGrpSpPr/>
+        <p:nvPr/>
+      </p:nvGrpSpPr>
+      <p:grpSpPr>
+        <a:xfrm>
+          <a:off x="0" y="0"/>
+          <a:ext cx="0" cy="0"/>
+          <a:chOff x="0" y="0"/>
+          <a:chExt cx="0" cy="0"/>
+        </a:xfrm>
+      </p:grpSpPr>
+      <p:sp>
+        <p:nvSpPr>
+          <p:cNvPr id="2" name="タイトル 1">
+            <a:extLst>
+              <a:ext uri="{FF2B5EF4-FFF2-40B4-BE49-F238E27FC236}">
+                <a16:creationId xmlns:a16="http://schemas.microsoft.com/office/drawing/2014/main" id="{91FD1223-F620-48B0-87E7-393277D0B7CD}"/>
+              </a:ext>
+            </a:extLst>
+          </p:cNvPr>
+          <p:cNvSpPr>
+            <a:spLocks noGrp="1"/>
+          </p:cNvSpPr>
+          <p:nvPr>
+            <p:ph type="title"/>
+          </p:nvPr>
+        </p:nvSpPr>
+        <p:spPr/>
+        <p:txBody>
+          <a:bodyPr/>
+          <a:lstStyle/>
+          <a:p>
+            <a:r>
+              <a:rPr lang="en-US" altLang="ja-JP" dirty="0"/>
+              <a:t>Roxygen2</a:t>
+            </a:r>
+            <a:r>
+              <a:rPr lang="ja-JP" altLang="en-US" dirty="0"/>
+              <a:t>のヘッダー情報</a:t>
+            </a:r>
+            <a:endParaRPr kumimoji="1" lang="ja-JP" altLang="en-US" dirty="0"/>
+          </a:p>
+        </p:txBody>
+      </p:sp>
+      <p:sp>
+        <p:nvSpPr>
+          <p:cNvPr id="3" name="コンテンツ プレースホルダー 2">
+            <a:extLst>
+              <a:ext uri="{FF2B5EF4-FFF2-40B4-BE49-F238E27FC236}">
+                <a16:creationId xmlns:a16="http://schemas.microsoft.com/office/drawing/2014/main" id="{A7CD10A0-F1FE-457D-9DE9-79087D542C7C}"/>
+              </a:ext>
+            </a:extLst>
+          </p:cNvPr>
+          <p:cNvSpPr>
+            <a:spLocks noGrp="1"/>
+          </p:cNvSpPr>
+          <p:nvPr>
+            <p:ph idx="1"/>
+          </p:nvPr>
+        </p:nvSpPr>
+        <p:spPr/>
+        <p:txBody>
+          <a:bodyPr/>
+          <a:lstStyle/>
+          <a:p>
+            <a:r>
+              <a:rPr kumimoji="1" lang="ja-JP" altLang="en-US" dirty="0"/>
+              <a:t>ユーザーへ伝える情報（内部情報は書かなくてよい）</a:t>
+            </a:r>
+            <a:endParaRPr kumimoji="1" lang="en-US" altLang="ja-JP" dirty="0"/>
+          </a:p>
+          <a:p>
+            <a:r>
+              <a:rPr kumimoji="1" lang="en-US" altLang="ja-JP" dirty="0"/>
+              <a:t>check()</a:t>
+            </a:r>
+            <a:r>
+              <a:rPr kumimoji="1" lang="ja-JP" altLang="en-US" dirty="0"/>
+              <a:t>の対象</a:t>
+            </a:r>
+            <a:endParaRPr kumimoji="1" lang="en-US" altLang="ja-JP" dirty="0"/>
+          </a:p>
+          <a:p>
+            <a:r>
+              <a:rPr lang="en-US" altLang="ja-JP" dirty="0"/>
+              <a:t>@export</a:t>
+            </a:r>
+          </a:p>
+          <a:p>
+            <a:pPr lvl="1"/>
+            <a:r>
+              <a:rPr lang="ja-JP" altLang="en-US" dirty="0"/>
+              <a:t>最小限にとどめる</a:t>
+            </a:r>
+            <a:endParaRPr lang="en-US" altLang="ja-JP" dirty="0"/>
+          </a:p>
+          <a:p>
+            <a:r>
+              <a:rPr lang="en-US" altLang="ja-JP" dirty="0"/>
+              <a:t>@name</a:t>
+            </a:r>
+          </a:p>
+          <a:p>
+            <a:r>
+              <a:rPr lang="en-US" altLang="ja-JP" dirty="0"/>
+              <a:t>@</a:t>
+            </a:r>
+            <a:r>
+              <a:rPr lang="en-US" altLang="ja-JP" dirty="0" err="1"/>
+              <a:t>noRD</a:t>
+            </a:r>
+            <a:endParaRPr lang="en-US" altLang="ja-JP" dirty="0"/>
+          </a:p>
+          <a:p>
+            <a:pPr lvl="1"/>
+            <a:r>
+              <a:rPr lang="en-US" altLang="ja-JP" dirty="0"/>
+              <a:t>RD</a:t>
+            </a:r>
+            <a:r>
+              <a:rPr lang="ja-JP" altLang="en-US" dirty="0"/>
+              <a:t>ファイルの管理を省略</a:t>
+            </a:r>
+            <a:endParaRPr lang="en-US" altLang="ja-JP" dirty="0"/>
+          </a:p>
+          <a:p>
+            <a:r>
+              <a:rPr lang="en-US" altLang="ja-JP" dirty="0"/>
+              <a:t>@</a:t>
+            </a:r>
+            <a:r>
+              <a:rPr lang="en-US" altLang="ja-JP" dirty="0" err="1"/>
+              <a:t>importFrom</a:t>
+            </a:r>
+            <a:endParaRPr kumimoji="1" lang="en-US" altLang="ja-JP" dirty="0"/>
+          </a:p>
+          <a:p>
+            <a:endParaRPr kumimoji="1" lang="ja-JP" altLang="en-US" dirty="0"/>
+          </a:p>
+        </p:txBody>
+      </p:sp>
+    </p:spTree>
+    <p:extLst>
+      <p:ext uri="{BB962C8B-B14F-4D97-AF65-F5344CB8AC3E}">
+        <p14:creationId xmlns:p14="http://schemas.microsoft.com/office/powerpoint/2010/main" val="3422651353"/>
+      </p:ext>
+    </p:extLst>
+  </p:cSld>
+  <p:clrMapOvr>
+    <a:masterClrMapping/>
+  </p:clrMapOvr>
+</p:sld>
+</file>
+
+<file path=ppt/slides/slide13.xml><?xml version="1.0" encoding="utf-8"?>
+<p:sld xmlns:a="http://schemas.openxmlformats.org/drawingml/2006/main" xmlns:r="http://schemas.openxmlformats.org/officeDocument/2006/relationships" xmlns:p="http://schemas.openxmlformats.org/presentationml/2006/main">
+  <p:cSld>
+    <p:spTree>
+      <p:nvGrpSpPr>
+        <p:cNvPr id="1" name=""/>
+        <p:cNvGrpSpPr/>
+        <p:nvPr/>
+      </p:nvGrpSpPr>
+      <p:grpSpPr>
+        <a:xfrm>
+          <a:off x="0" y="0"/>
+          <a:ext cx="0" cy="0"/>
+          <a:chOff x="0" y="0"/>
+          <a:chExt cx="0" cy="0"/>
+        </a:xfrm>
+      </p:grpSpPr>
+      <p:sp>
+        <p:nvSpPr>
+          <p:cNvPr id="2" name="タイトル 1">
+            <a:extLst>
+              <a:ext uri="{FF2B5EF4-FFF2-40B4-BE49-F238E27FC236}">
+                <a16:creationId xmlns:a16="http://schemas.microsoft.com/office/drawing/2014/main" id="{79009955-77B5-4FAA-A5B7-2B62EC124ACE}"/>
+              </a:ext>
+            </a:extLst>
+          </p:cNvPr>
+          <p:cNvSpPr>
+            <a:spLocks noGrp="1"/>
+          </p:cNvSpPr>
+          <p:nvPr>
+            <p:ph type="title"/>
+          </p:nvPr>
+        </p:nvSpPr>
+        <p:spPr/>
+        <p:txBody>
+          <a:bodyPr/>
+          <a:lstStyle/>
+          <a:p>
+            <a:r>
+              <a:rPr kumimoji="1" lang="ja-JP" altLang="en-US" dirty="0"/>
+              <a:t>役に立ったアプローチ</a:t>
+            </a:r>
+          </a:p>
+        </p:txBody>
+      </p:sp>
+      <p:sp>
+        <p:nvSpPr>
+          <p:cNvPr id="3" name="コンテンツ プレースホルダー 2">
+            <a:extLst>
+              <a:ext uri="{FF2B5EF4-FFF2-40B4-BE49-F238E27FC236}">
+                <a16:creationId xmlns:a16="http://schemas.microsoft.com/office/drawing/2014/main" id="{61935D4F-0D5C-4DC7-A87E-390DA0E1D482}"/>
+              </a:ext>
+            </a:extLst>
+          </p:cNvPr>
+          <p:cNvSpPr>
+            <a:spLocks noGrp="1"/>
+          </p:cNvSpPr>
+          <p:nvPr>
+            <p:ph idx="1"/>
+          </p:nvPr>
+        </p:nvSpPr>
+        <p:spPr/>
+        <p:txBody>
+          <a:bodyPr/>
+          <a:lstStyle/>
+          <a:p>
+            <a:pPr marL="514350" indent="-514350">
+              <a:buFont typeface="+mj-lt"/>
+              <a:buAutoNum type="arabicPeriod"/>
+            </a:pPr>
+            <a:r>
+              <a:rPr lang="en-US" altLang="ja-JP" dirty="0" err="1"/>
+              <a:t>testthat</a:t>
+            </a:r>
+            <a:r>
+              <a:rPr lang="ja-JP" altLang="en-US" dirty="0"/>
+              <a:t>関数による動作検証</a:t>
+            </a:r>
+            <a:endParaRPr lang="en-US" altLang="ja-JP" dirty="0"/>
+          </a:p>
+          <a:p>
+            <a:pPr marL="514350" indent="-514350">
+              <a:buFont typeface="+mj-lt"/>
+              <a:buAutoNum type="arabicPeriod"/>
+            </a:pPr>
+            <a:r>
+              <a:rPr lang="ja-JP" altLang="en-US" dirty="0"/>
+              <a:t>プロットの入出力・ロジックは</a:t>
+            </a:r>
+            <a:r>
+              <a:rPr lang="en-US" altLang="ja-JP" dirty="0"/>
+              <a:t>ggplot2</a:t>
+            </a:r>
+            <a:r>
+              <a:rPr lang="ja-JP" altLang="en-US" dirty="0"/>
+              <a:t>の文法に従う</a:t>
+            </a:r>
+            <a:endParaRPr lang="en-US" altLang="ja-JP" dirty="0"/>
+          </a:p>
+          <a:p>
+            <a:pPr marL="514350" indent="-514350">
+              <a:buFont typeface="+mj-lt"/>
+              <a:buAutoNum type="arabicPeriod"/>
+            </a:pPr>
+            <a:r>
+              <a:rPr lang="ja-JP" altLang="en-US" dirty="0"/>
+              <a:t>統計量の入出力・ロジックは</a:t>
+            </a:r>
+            <a:r>
+              <a:rPr lang="en-US" altLang="ja-JP" dirty="0" err="1"/>
+              <a:t>survfit</a:t>
+            </a:r>
+            <a:r>
+              <a:rPr lang="ja-JP" altLang="en-US" dirty="0"/>
+              <a:t>の文法に従う</a:t>
+            </a:r>
+            <a:endParaRPr lang="en-US" altLang="ja-JP" dirty="0"/>
+          </a:p>
+          <a:p>
+            <a:pPr marL="514350" indent="-514350">
+              <a:buFont typeface="+mj-lt"/>
+              <a:buAutoNum type="arabicPeriod"/>
+            </a:pPr>
+            <a:r>
+              <a:rPr lang="en-US" altLang="ja-JP" dirty="0"/>
+              <a:t>GitHub</a:t>
+            </a:r>
+            <a:r>
+              <a:rPr lang="ja-JP" altLang="en-US" dirty="0"/>
+              <a:t>ブランチによるバックアップ</a:t>
+            </a:r>
+            <a:endParaRPr lang="en-US" altLang="ja-JP" dirty="0"/>
+          </a:p>
+          <a:p>
+            <a:pPr marL="514350" indent="-514350">
+              <a:buFont typeface="+mj-lt"/>
+              <a:buAutoNum type="arabicPeriod"/>
+            </a:pPr>
+            <a:r>
+              <a:rPr lang="ja-JP" altLang="en-US" dirty="0"/>
+              <a:t>広範囲の影響の小さい修正は</a:t>
+            </a:r>
+            <a:r>
+              <a:rPr kumimoji="1" lang="en-US" altLang="ja-JP" dirty="0"/>
+              <a:t>Codex </a:t>
+            </a:r>
+            <a:r>
+              <a:rPr kumimoji="1" lang="en-US" altLang="ja-JP" dirty="0" err="1"/>
+              <a:t>CLI</a:t>
+            </a:r>
+            <a:r>
+              <a:rPr lang="en-US" altLang="ja-JP" dirty="0" err="1"/>
+              <a:t>+</a:t>
+            </a:r>
+            <a:r>
+              <a:rPr kumimoji="1" lang="en-US" altLang="ja-JP" dirty="0" err="1"/>
+              <a:t>GitHub</a:t>
+            </a:r>
+            <a:r>
+              <a:rPr kumimoji="1" lang="ja-JP" altLang="en-US" dirty="0"/>
+              <a:t>を利用</a:t>
+            </a:r>
+            <a:endParaRPr kumimoji="1" lang="en-US" altLang="ja-JP" dirty="0"/>
+          </a:p>
+          <a:p>
+            <a:pPr marL="514350" indent="-514350">
+              <a:buFont typeface="+mj-lt"/>
+              <a:buAutoNum type="arabicPeriod"/>
+            </a:pPr>
+            <a:r>
+              <a:rPr lang="en-US" altLang="ja-JP" dirty="0"/>
+              <a:t>MIT</a:t>
+            </a:r>
+            <a:r>
+              <a:rPr lang="ja-JP" altLang="en-US" dirty="0"/>
+              <a:t>ライセンス（</a:t>
+            </a:r>
+            <a:r>
+              <a:rPr lang="en-US" altLang="ja-JP" dirty="0"/>
+              <a:t>GPL</a:t>
+            </a:r>
+            <a:r>
+              <a:rPr lang="ja-JP" altLang="en-US" dirty="0"/>
+              <a:t>ライセンスのパッケージに依存</a:t>
+            </a:r>
+            <a:r>
+              <a:rPr lang="ja-JP" altLang="en-US"/>
+              <a:t>しない）</a:t>
+            </a:r>
+            <a:endParaRPr lang="en-US" altLang="ja-JP" dirty="0"/>
+          </a:p>
+        </p:txBody>
+      </p:sp>
+    </p:spTree>
+    <p:extLst>
+      <p:ext uri="{BB962C8B-B14F-4D97-AF65-F5344CB8AC3E}">
+        <p14:creationId xmlns:p14="http://schemas.microsoft.com/office/powerpoint/2010/main" val="3093885914"/>
+      </p:ext>
+    </p:extLst>
+  </p:cSld>
+  <p:clrMapOvr>
+    <a:masterClrMapping/>
+  </p:clrMapOvr>
+</p:sld>
+</file>
+
 <file path=ppt/slides/slide2.xml><?xml version="1.0" encoding="utf-8"?>
 <p:sld xmlns:a="http://schemas.openxmlformats.org/drawingml/2006/main" xmlns:r="http://schemas.openxmlformats.org/officeDocument/2006/relationships" xmlns:p="http://schemas.openxmlformats.org/presentationml/2006/main">
   <p:cSld>
@@ -5244,7 +5976,7 @@
           <p:cNvPr id="2" name="タイトル 1">
             <a:extLst>
               <a:ext uri="{FF2B5EF4-FFF2-40B4-BE49-F238E27FC236}">
-                <a16:creationId xmlns:a16="http://schemas.microsoft.com/office/drawing/2014/main" id="{46525439-09F3-4E2E-B4E2-1B63ED4E7C74}"/>
+                <a16:creationId xmlns:a16="http://schemas.microsoft.com/office/drawing/2014/main" id="{A8F27C1B-2404-4B1F-8F6D-D9578A8A9EDB}"/>
               </a:ext>
             </a:extLst>
           </p:cNvPr>
@@ -5262,19 +5994,15 @@
           <a:p>
             <a:r>
               <a:rPr lang="en-US" altLang="ja-JP" dirty="0" err="1"/>
-              <a:t>cifplot</a:t>
+              <a:t>cifcurve</a:t>
             </a:r>
             <a:r>
               <a:rPr lang="en-US" altLang="ja-JP" dirty="0"/>
               <a:t>()</a:t>
             </a:r>
             <a:r>
-              <a:rPr lang="ja-JP" altLang="en-US"/>
-              <a:t>のロジック</a:t>
-            </a:r>
-            <a:r>
               <a:rPr lang="ja-JP" altLang="en-US" dirty="0"/>
-              <a:t>を構成する関数</a:t>
+              <a:t>のロジックを構成する関数</a:t>
             </a:r>
             <a:endParaRPr kumimoji="1" lang="ja-JP" altLang="en-US" dirty="0"/>
           </a:p>
@@ -5285,7 +6013,7 @@
           <p:cNvPr id="3" name="コンテンツ プレースホルダー 2">
             <a:extLst>
               <a:ext uri="{FF2B5EF4-FFF2-40B4-BE49-F238E27FC236}">
-                <a16:creationId xmlns:a16="http://schemas.microsoft.com/office/drawing/2014/main" id="{5B73CB70-23AE-4375-AFE6-21B34DD533DA}"/>
+                <a16:creationId xmlns:a16="http://schemas.microsoft.com/office/drawing/2014/main" id="{218F19D0-C1C7-4A9D-A6B5-5D0172C5FC7E}"/>
               </a:ext>
             </a:extLst>
           </p:cNvPr>
@@ -5298,12 +6026,14 @@
         </p:nvSpPr>
         <p:spPr/>
         <p:txBody>
-          <a:bodyPr/>
+          <a:bodyPr>
+            <a:normAutofit lnSpcReduction="10000"/>
+          </a:bodyPr>
           <a:lstStyle/>
           <a:p>
             <a:r>
               <a:rPr lang="en-US" altLang="ja-JP" dirty="0" err="1"/>
-              <a:t>cifplot_single</a:t>
+              <a:t>calculateKM</a:t>
             </a:r>
             <a:r>
               <a:rPr lang="en-US" altLang="ja-JP" dirty="0"/>
@@ -5311,19 +6041,53 @@
             </a:r>
           </a:p>
           <a:p>
-            <a:endParaRPr kumimoji="1" lang="en-US" altLang="ja-JP" dirty="0"/>
-          </a:p>
-          <a:p>
+            <a:pPr lvl="1"/>
+            <a:r>
+              <a:rPr lang="ja-JP" altLang="en-US" dirty="0"/>
+              <a:t>層別</a:t>
+            </a:r>
+            <a:r>
+              <a:rPr lang="en-US" altLang="ja-JP" dirty="0"/>
+              <a:t>Kaplan-Meier</a:t>
+            </a:r>
+            <a:r>
+              <a:rPr lang="ja-JP" altLang="en-US" dirty="0"/>
+              <a:t>推定量とその</a:t>
+            </a:r>
+            <a:r>
+              <a:rPr lang="en-US" altLang="ja-JP" dirty="0"/>
+              <a:t>SE</a:t>
+            </a:r>
+            <a:r>
+              <a:rPr lang="ja-JP" altLang="en-US" dirty="0"/>
+              <a:t>を計算する</a:t>
+            </a:r>
             <a:r>
               <a:rPr lang="en-US" altLang="ja-JP" dirty="0" err="1"/>
-              <a:t>call_ggsurvfit</a:t>
+              <a:t>Rcpp</a:t>
+            </a:r>
+            <a:r>
+              <a:rPr lang="ja-JP" altLang="en-US" dirty="0"/>
+              <a:t>関数</a:t>
             </a:r>
             <a:endParaRPr lang="en-US" altLang="ja-JP" dirty="0"/>
           </a:p>
           <a:p>
+            <a:pPr lvl="1"/>
             <a:r>
               <a:rPr lang="en-US" altLang="ja-JP" dirty="0" err="1"/>
-              <a:t>check_ggsurvfit</a:t>
+              <a:t>survfit</a:t>
+            </a:r>
+            <a:r>
+              <a:rPr lang="ja-JP" altLang="en-US" dirty="0"/>
+              <a:t>オブジェクトの文法に従う</a:t>
+            </a:r>
+            <a:endParaRPr lang="en-US" altLang="ja-JP" dirty="0"/>
+          </a:p>
+          <a:p>
+            <a:r>
+              <a:rPr lang="en-US" altLang="ja-JP" dirty="0" err="1"/>
+              <a:t>calculateCI</a:t>
             </a:r>
             <a:r>
               <a:rPr lang="en-US" altLang="ja-JP" dirty="0"/>
@@ -5334,23 +6098,75 @@
             <a:pPr lvl="1"/>
             <a:r>
               <a:rPr lang="ja-JP" altLang="en-US" dirty="0"/>
-              <a:t>プロットの指定に従って</a:t>
-            </a:r>
+              <a:t>信頼区間</a:t>
+            </a:r>
+            <a:endParaRPr lang="en-US" altLang="ja-JP" dirty="0"/>
+          </a:p>
+          <a:p>
+            <a:pPr lvl="1"/>
             <a:r>
               <a:rPr lang="en-US" altLang="ja-JP" dirty="0" err="1"/>
-              <a:t>g</a:t>
-            </a:r>
-            <a:r>
-              <a:rPr kumimoji="1" lang="en-US" altLang="ja-JP" dirty="0" err="1"/>
-              <a:t>gsurvfit</a:t>
-            </a:r>
+              <a:t>survfit</a:t>
+            </a:r>
+            <a:r>
+              <a:rPr lang="ja-JP" altLang="en-US" dirty="0"/>
+              <a:t>オブジェクトの文法に従う</a:t>
+            </a:r>
+            <a:endParaRPr lang="en-US" altLang="ja-JP" dirty="0"/>
+          </a:p>
+          <a:p>
+            <a:r>
+              <a:rPr lang="en-US" altLang="ja-JP" dirty="0" err="1"/>
+              <a:t>calculateAJ</a:t>
+            </a:r>
+            <a:r>
+              <a:rPr lang="en-US" altLang="ja-JP" dirty="0"/>
+              <a:t>()</a:t>
+            </a:r>
+          </a:p>
+          <a:p>
+            <a:pPr lvl="1"/>
+            <a:r>
+              <a:rPr lang="en-US" altLang="ja-JP" dirty="0" err="1"/>
+              <a:t>calculateKM</a:t>
+            </a:r>
+            <a:r>
+              <a:rPr lang="en-US" altLang="ja-JP" dirty="0"/>
+              <a:t>()</a:t>
+            </a:r>
+            <a:r>
+              <a:rPr lang="ja-JP" altLang="en-US" dirty="0"/>
+              <a:t>を用いて層別</a:t>
+            </a:r>
+            <a:r>
+              <a:rPr lang="en-US" altLang="ja-JP" dirty="0"/>
+              <a:t>Aalen-Johansen</a:t>
+            </a:r>
+            <a:r>
+              <a:rPr lang="ja-JP" altLang="en-US" dirty="0"/>
+              <a:t>推定量を計算</a:t>
+            </a:r>
+            <a:endParaRPr lang="en-US" altLang="ja-JP" dirty="0"/>
+          </a:p>
+          <a:p>
+            <a:r>
+              <a:rPr lang="en-US" altLang="ja-JP" dirty="0" err="1"/>
+              <a:t>calculateAalenDeltaSE</a:t>
+            </a:r>
+            <a:r>
+              <a:rPr lang="en-US" altLang="ja-JP" dirty="0"/>
+              <a:t>()</a:t>
+            </a:r>
+          </a:p>
+          <a:p>
+            <a:pPr lvl="1"/>
             <a:r>
               <a:rPr kumimoji="1" lang="en-US" altLang="ja-JP" dirty="0"/>
-              <a:t>()</a:t>
+              <a:t>SE</a:t>
             </a:r>
             <a:r>
               <a:rPr kumimoji="1" lang="ja-JP" altLang="en-US" dirty="0"/>
-              <a:t>を実行</a:t>
+              <a:t>の計算</a:t>
             </a:r>
           </a:p>
         </p:txBody>
@@ -5358,7 +6174,7 @@
     </p:spTree>
     <p:extLst>
       <p:ext uri="{BB962C8B-B14F-4D97-AF65-F5344CB8AC3E}">
-        <p14:creationId xmlns:p14="http://schemas.microsoft.com/office/powerpoint/2010/main" val="60562793"/>
+        <p14:creationId xmlns:p14="http://schemas.microsoft.com/office/powerpoint/2010/main" val="173930505"/>
       </p:ext>
     </p:extLst>
   </p:cSld>

</xml_diff>